<commit_message>
Completed initial version of EDA jupyter notebook for business establishments and residential dwellings. Work in Progress of Use Case EDA PPT.
Former-commit-id: ef93bcb199475e198f2180581cabc4de7d53f38c [formerly 36603fd660a66c2acd920f160561b524a66e0f82]
Former-commit-id: 46b88cc094c9e54891dee73bc95b3e6fd847b23c
</commit_message>
<xml_diff>
--- a/datascience/CLUE/businessopportunity/CLUE-UseCaseEDA-BusinessOpportunity.pptx
+++ b/datascience/CLUE/businessopportunity/CLUE-UseCaseEDA-BusinessOpportunity.pptx
@@ -5,15 +5,14 @@
     <p:sldMasterId id="2147483701" r:id="rId1"/>
   </p:sldMasterIdLst>
   <p:notesMasterIdLst>
-    <p:notesMasterId r:id="rId8"/>
+    <p:notesMasterId r:id="rId7"/>
   </p:notesMasterIdLst>
   <p:sldIdLst>
     <p:sldId id="266" r:id="rId2"/>
     <p:sldId id="267" r:id="rId3"/>
     <p:sldId id="268" r:id="rId4"/>
-    <p:sldId id="269" r:id="rId5"/>
-    <p:sldId id="271" r:id="rId6"/>
-    <p:sldId id="270" r:id="rId7"/>
+    <p:sldId id="271" r:id="rId5"/>
+    <p:sldId id="270" r:id="rId6"/>
   </p:sldIdLst>
   <p:sldSz cx="12192000" cy="6858000"/>
   <p:notesSz cx="6858000" cy="9144000"/>
@@ -202,7 +201,7 @@
           <a:p>
             <a:fld id="{5BDAD86B-528A-4351-9904-8689588B2577}" type="datetimeFigureOut">
               <a:rPr lang="en-AU" smtClean="0"/>
-              <a:t>16/11/2021</a:t>
+              <a:t>17/11/2021</a:t>
             </a:fld>
             <a:endParaRPr lang="en-AU"/>
           </a:p>
@@ -744,7 +743,7 @@
           <a:p>
             <a:fld id="{CC2DF393-E83C-4EBE-BF9B-01B33F8F8C5F}" type="datetimeFigureOut">
               <a:rPr lang="en-AU" smtClean="0"/>
-              <a:t>16/11/2021</a:t>
+              <a:t>17/11/2021</a:t>
             </a:fld>
             <a:endParaRPr lang="en-AU"/>
           </a:p>
@@ -978,7 +977,7 @@
           <a:p>
             <a:fld id="{CC2DF393-E83C-4EBE-BF9B-01B33F8F8C5F}" type="datetimeFigureOut">
               <a:rPr lang="en-AU" smtClean="0"/>
-              <a:t>16/11/2021</a:t>
+              <a:t>17/11/2021</a:t>
             </a:fld>
             <a:endParaRPr lang="en-AU"/>
           </a:p>
@@ -1202,7 +1201,7 @@
           <a:p>
             <a:fld id="{CC2DF393-E83C-4EBE-BF9B-01B33F8F8C5F}" type="datetimeFigureOut">
               <a:rPr lang="en-AU" smtClean="0"/>
-              <a:t>16/11/2021</a:t>
+              <a:t>17/11/2021</a:t>
             </a:fld>
             <a:endParaRPr lang="en-AU"/>
           </a:p>
@@ -1502,7 +1501,7 @@
           <a:p>
             <a:fld id="{CC2DF393-E83C-4EBE-BF9B-01B33F8F8C5F}" type="datetimeFigureOut">
               <a:rPr lang="en-AU" smtClean="0"/>
-              <a:t>16/11/2021</a:t>
+              <a:t>17/11/2021</a:t>
             </a:fld>
             <a:endParaRPr lang="en-AU"/>
           </a:p>
@@ -1794,7 +1793,7 @@
           <a:p>
             <a:fld id="{CC2DF393-E83C-4EBE-BF9B-01B33F8F8C5F}" type="datetimeFigureOut">
               <a:rPr lang="en-AU" smtClean="0"/>
-              <a:t>16/11/2021</a:t>
+              <a:t>17/11/2021</a:t>
             </a:fld>
             <a:endParaRPr lang="en-AU"/>
           </a:p>
@@ -2233,7 +2232,7 @@
           <a:p>
             <a:fld id="{CC2DF393-E83C-4EBE-BF9B-01B33F8F8C5F}" type="datetimeFigureOut">
               <a:rPr lang="en-AU" smtClean="0"/>
-              <a:t>16/11/2021</a:t>
+              <a:t>17/11/2021</a:t>
             </a:fld>
             <a:endParaRPr lang="en-AU"/>
           </a:p>
@@ -2399,7 +2398,7 @@
           <a:p>
             <a:fld id="{CC2DF393-E83C-4EBE-BF9B-01B33F8F8C5F}" type="datetimeFigureOut">
               <a:rPr lang="en-AU" smtClean="0"/>
-              <a:t>16/11/2021</a:t>
+              <a:t>17/11/2021</a:t>
             </a:fld>
             <a:endParaRPr lang="en-AU"/>
           </a:p>
@@ -2536,7 +2535,7 @@
           <a:p>
             <a:fld id="{CC2DF393-E83C-4EBE-BF9B-01B33F8F8C5F}" type="datetimeFigureOut">
               <a:rPr lang="en-AU" smtClean="0"/>
-              <a:t>16/11/2021</a:t>
+              <a:t>17/11/2021</a:t>
             </a:fld>
             <a:endParaRPr lang="en-AU"/>
           </a:p>
@@ -2873,7 +2872,7 @@
           <a:p>
             <a:fld id="{CC2DF393-E83C-4EBE-BF9B-01B33F8F8C5F}" type="datetimeFigureOut">
               <a:rPr lang="en-AU" smtClean="0"/>
-              <a:t>16/11/2021</a:t>
+              <a:t>17/11/2021</a:t>
             </a:fld>
             <a:endParaRPr lang="en-AU"/>
           </a:p>
@@ -3186,7 +3185,7 @@
           <a:p>
             <a:fld id="{CC2DF393-E83C-4EBE-BF9B-01B33F8F8C5F}" type="datetimeFigureOut">
               <a:rPr lang="en-AU" smtClean="0"/>
-              <a:t>16/11/2021</a:t>
+              <a:t>17/11/2021</a:t>
             </a:fld>
             <a:endParaRPr lang="en-AU"/>
           </a:p>
@@ -4683,42 +4682,12 @@
           </a:p>
         </p:txBody>
       </p:sp>
-      <p:pic>
-        <p:nvPicPr>
-          <p:cNvPr id="7" name="Picture 6">
-            <a:extLst>
-              <a:ext uri="{FF2B5EF4-FFF2-40B4-BE49-F238E27FC236}">
-                <a16:creationId xmlns:a16="http://schemas.microsoft.com/office/drawing/2014/main" id="{BEB58C46-D904-488A-A723-CE2816DD7521}"/>
-              </a:ext>
-            </a:extLst>
-          </p:cNvPr>
-          <p:cNvPicPr>
-            <a:picLocks noChangeAspect="1"/>
-          </p:cNvPicPr>
-          <p:nvPr/>
-        </p:nvPicPr>
-        <p:blipFill>
-          <a:blip r:embed="rId2"/>
-          <a:stretch>
-            <a:fillRect/>
-          </a:stretch>
-        </p:blipFill>
-        <p:spPr>
-          <a:xfrm>
-            <a:off x="6075674" y="1859980"/>
-            <a:ext cx="5734453" cy="4487487"/>
-          </a:xfrm>
-          <a:prstGeom prst="rect">
-            <a:avLst/>
-          </a:prstGeom>
-        </p:spPr>
-      </p:pic>
-      <p:sp>
-        <p:nvSpPr>
-          <p:cNvPr id="8" name="TextBox 7">
-            <a:extLst>
-              <a:ext uri="{FF2B5EF4-FFF2-40B4-BE49-F238E27FC236}">
-                <a16:creationId xmlns:a16="http://schemas.microsoft.com/office/drawing/2014/main" id="{F6BAE99A-2B2A-45CB-A786-B9D452D69A46}"/>
+      <p:sp>
+        <p:nvSpPr>
+          <p:cNvPr id="10" name="TextBox 9">
+            <a:extLst>
+              <a:ext uri="{FF2B5EF4-FFF2-40B4-BE49-F238E27FC236}">
+                <a16:creationId xmlns:a16="http://schemas.microsoft.com/office/drawing/2014/main" id="{496CBFBF-0833-40D1-A5A9-980EFF83B468}"/>
               </a:ext>
             </a:extLst>
           </p:cNvPr>
@@ -4727,8 +4696,8 @@
         </p:nvSpPr>
         <p:spPr>
           <a:xfrm>
-            <a:off x="8123549" y="1291439"/>
-            <a:ext cx="3881191" cy="877163"/>
+            <a:off x="6781800" y="607059"/>
+            <a:ext cx="5222940" cy="400110"/>
           </a:xfrm>
           <a:prstGeom prst="rect">
             <a:avLst/>
@@ -4736,83 +4705,6 @@
           <a:noFill/>
         </p:spPr>
         <p:txBody>
-          <a:bodyPr wrap="none" rtlCol="0">
-            <a:spAutoFit/>
-          </a:bodyPr>
-          <a:lstStyle/>
-          <a:p>
-            <a:r>
-              <a:rPr lang="en-AU" sz="2000" dirty="0"/>
-              <a:t>Dwelling Density by CLUE Block</a:t>
-            </a:r>
-          </a:p>
-          <a:p>
-            <a:r>
-              <a:rPr lang="en-AU" sz="1100" dirty="0">
-                <a:effectLst/>
-                <a:latin typeface="Calibri" panose="020F0502020204030204" pitchFamily="34" charset="0"/>
-                <a:ea typeface="Calibri" panose="020F0502020204030204" pitchFamily="34" charset="0"/>
-                <a:cs typeface="Times New Roman" panose="02020603050405020304" pitchFamily="18" charset="0"/>
-              </a:rPr>
-              <a:t>(Source: </a:t>
-            </a:r>
-            <a:r>
-              <a:rPr lang="en-US" sz="1100" dirty="0">
-                <a:hlinkClick r:id="rId3"/>
-              </a:rPr>
-              <a:t>CLUE interactive </a:t>
-            </a:r>
-            <a:r>
-              <a:rPr lang="en-US" sz="1100" dirty="0" err="1">
-                <a:hlinkClick r:id="rId3"/>
-              </a:rPr>
-              <a:t>visualisation</a:t>
-            </a:r>
-            <a:r>
-              <a:rPr lang="en-US" sz="1100" dirty="0">
-                <a:hlinkClick r:id="rId3"/>
-              </a:rPr>
-              <a:t> - City of Melbourne</a:t>
-            </a:r>
-            <a:r>
-              <a:rPr lang="en-US" sz="1100" dirty="0"/>
-              <a:t>)</a:t>
-            </a:r>
-            <a:endParaRPr lang="en-AU" sz="1100" dirty="0">
-              <a:effectLst/>
-              <a:latin typeface="Calibri" panose="020F0502020204030204" pitchFamily="34" charset="0"/>
-              <a:ea typeface="Calibri" panose="020F0502020204030204" pitchFamily="34" charset="0"/>
-              <a:cs typeface="Times New Roman" panose="02020603050405020304" pitchFamily="18" charset="0"/>
-            </a:endParaRPr>
-          </a:p>
-          <a:p>
-            <a:endParaRPr lang="en-AU" sz="2000" dirty="0"/>
-          </a:p>
-        </p:txBody>
-      </p:sp>
-      <p:sp>
-        <p:nvSpPr>
-          <p:cNvPr id="10" name="TextBox 9">
-            <a:extLst>
-              <a:ext uri="{FF2B5EF4-FFF2-40B4-BE49-F238E27FC236}">
-                <a16:creationId xmlns:a16="http://schemas.microsoft.com/office/drawing/2014/main" id="{496CBFBF-0833-40D1-A5A9-980EFF83B468}"/>
-              </a:ext>
-            </a:extLst>
-          </p:cNvPr>
-          <p:cNvSpPr txBox="1"/>
-          <p:nvPr/>
-        </p:nvSpPr>
-        <p:spPr>
-          <a:xfrm>
-            <a:off x="6781800" y="607059"/>
-            <a:ext cx="5222940" cy="400110"/>
-          </a:xfrm>
-          <a:prstGeom prst="rect">
-            <a:avLst/>
-          </a:prstGeom>
-          <a:noFill/>
-        </p:spPr>
-        <p:txBody>
           <a:bodyPr wrap="square">
             <a:spAutoFit/>
           </a:bodyPr>
@@ -4826,44 +4718,6 @@
           </a:p>
         </p:txBody>
       </p:sp>
-      <p:cxnSp>
-        <p:nvCxnSpPr>
-          <p:cNvPr id="12" name="Straight Connector 11">
-            <a:extLst>
-              <a:ext uri="{FF2B5EF4-FFF2-40B4-BE49-F238E27FC236}">
-                <a16:creationId xmlns:a16="http://schemas.microsoft.com/office/drawing/2014/main" id="{8E8D3D08-E919-42FD-98FD-2332E7B386B2}"/>
-              </a:ext>
-            </a:extLst>
-          </p:cNvPr>
-          <p:cNvCxnSpPr>
-            <a:cxnSpLocks/>
-          </p:cNvCxnSpPr>
-          <p:nvPr/>
-        </p:nvCxnSpPr>
-        <p:spPr>
-          <a:xfrm>
-            <a:off x="5549900" y="807114"/>
-            <a:ext cx="0" cy="5809586"/>
-          </a:xfrm>
-          <a:prstGeom prst="line">
-            <a:avLst/>
-          </a:prstGeom>
-        </p:spPr>
-        <p:style>
-          <a:lnRef idx="1">
-            <a:schemeClr val="accent1"/>
-          </a:lnRef>
-          <a:fillRef idx="0">
-            <a:schemeClr val="accent1"/>
-          </a:fillRef>
-          <a:effectRef idx="0">
-            <a:schemeClr val="accent1"/>
-          </a:effectRef>
-          <a:fontRef idx="minor">
-            <a:schemeClr val="tx1"/>
-          </a:fontRef>
-        </p:style>
-      </p:cxnSp>
       <p:sp>
         <p:nvSpPr>
           <p:cNvPr id="14" name="TextBox 13">
@@ -4879,7 +4733,7 @@
         <p:spPr>
           <a:xfrm>
             <a:off x="600074" y="4217399"/>
-            <a:ext cx="4338637" cy="2444387"/>
+            <a:ext cx="4338637" cy="2180918"/>
           </a:xfrm>
           <a:prstGeom prst="rect">
             <a:avLst/>
@@ -4909,7 +4763,7 @@
                 <a:ea typeface="Calibri" panose="020F0502020204030204" pitchFamily="34" charset="0"/>
                 <a:cs typeface="Arial" panose="020B0604020202020204" pitchFamily="34" charset="0"/>
               </a:rPr>
-              <a:t>DATA PROFILE</a:t>
+              <a:t>DATA QUALITY</a:t>
             </a:r>
           </a:p>
           <a:p>
@@ -4934,6 +4788,33 @@
                 <a:spcPct val="107000"/>
               </a:lnSpc>
             </a:pPr>
+            <a:r>
+              <a:rPr lang="en-AU" sz="1600" dirty="0">
+                <a:solidFill>
+                  <a:schemeClr val="bg1"/>
+                </a:solidFill>
+                <a:latin typeface="Arial" panose="020B0604020202020204" pitchFamily="34" charset="0"/>
+                <a:ea typeface="Calibri" panose="020F0502020204030204" pitchFamily="34" charset="0"/>
+                <a:cs typeface="Arial" panose="020B0604020202020204" pitchFamily="34" charset="0"/>
+              </a:rPr>
+              <a:t>2 records with missing Lat, Long and Location</a:t>
+            </a:r>
+            <a:endParaRPr lang="en-AU" sz="1600" dirty="0">
+              <a:solidFill>
+                <a:schemeClr val="bg1"/>
+              </a:solidFill>
+              <a:effectLst/>
+              <a:latin typeface="Arial" panose="020B0604020202020204" pitchFamily="34" charset="0"/>
+              <a:ea typeface="Calibri" panose="020F0502020204030204" pitchFamily="34" charset="0"/>
+              <a:cs typeface="Arial" panose="020B0604020202020204" pitchFamily="34" charset="0"/>
+            </a:endParaRPr>
+          </a:p>
+          <a:p>
+            <a:pPr lvl="0">
+              <a:lnSpc>
+                <a:spcPct val="107000"/>
+              </a:lnSpc>
+            </a:pPr>
             <a:endParaRPr lang="en-AU" sz="1600" dirty="0">
               <a:solidFill>
                 <a:schemeClr val="bg1"/>
@@ -5006,39 +4887,38 @@
               <a:cs typeface="Arial" panose="020B0604020202020204" pitchFamily="34" charset="0"/>
             </a:endParaRPr>
           </a:p>
-          <a:p>
-            <a:pPr lvl="0">
-              <a:lnSpc>
-                <a:spcPct val="107000"/>
-              </a:lnSpc>
-            </a:pPr>
-            <a:endParaRPr lang="en-AU" sz="1600" dirty="0">
-              <a:solidFill>
-                <a:schemeClr val="bg1"/>
-              </a:solidFill>
-              <a:latin typeface="Arial" panose="020B0604020202020204" pitchFamily="34" charset="0"/>
-              <a:ea typeface="Calibri" panose="020F0502020204030204" pitchFamily="34" charset="0"/>
-              <a:cs typeface="Arial" panose="020B0604020202020204" pitchFamily="34" charset="0"/>
-            </a:endParaRPr>
-          </a:p>
-          <a:p>
-            <a:pPr lvl="0">
-              <a:lnSpc>
-                <a:spcPct val="107000"/>
-              </a:lnSpc>
-            </a:pPr>
-            <a:endParaRPr lang="en-AU" sz="1600" dirty="0">
-              <a:solidFill>
-                <a:schemeClr val="bg1"/>
-              </a:solidFill>
-              <a:effectLst/>
-              <a:latin typeface="Arial" panose="020B0604020202020204" pitchFamily="34" charset="0"/>
-              <a:ea typeface="Calibri" panose="020F0502020204030204" pitchFamily="34" charset="0"/>
-              <a:cs typeface="Arial" panose="020B0604020202020204" pitchFamily="34" charset="0"/>
-            </a:endParaRPr>
-          </a:p>
-        </p:txBody>
-      </p:sp>
+        </p:txBody>
+      </p:sp>
+      <p:pic>
+        <p:nvPicPr>
+          <p:cNvPr id="5" name="Picture 4">
+            <a:extLst>
+              <a:ext uri="{FF2B5EF4-FFF2-40B4-BE49-F238E27FC236}">
+                <a16:creationId xmlns:a16="http://schemas.microsoft.com/office/drawing/2014/main" id="{57197647-F9C0-4EFA-8055-4FD4DA126786}"/>
+              </a:ext>
+            </a:extLst>
+          </p:cNvPr>
+          <p:cNvPicPr>
+            <a:picLocks noChangeAspect="1"/>
+          </p:cNvPicPr>
+          <p:nvPr/>
+        </p:nvPicPr>
+        <p:blipFill>
+          <a:blip r:embed="rId2"/>
+          <a:stretch>
+            <a:fillRect/>
+          </a:stretch>
+        </p:blipFill>
+        <p:spPr>
+          <a:xfrm>
+            <a:off x="5322514" y="1428206"/>
+            <a:ext cx="6682226" cy="5267068"/>
+          </a:xfrm>
+          <a:prstGeom prst="rect">
+            <a:avLst/>
+          </a:prstGeom>
+        </p:spPr>
+      </p:pic>
     </p:spTree>
     <p:extLst>
       <p:ext uri="{BB962C8B-B14F-4D97-AF65-F5344CB8AC3E}">
@@ -5334,10 +5214,10 @@
       </p:sp>
       <p:sp>
         <p:nvSpPr>
-          <p:cNvPr id="5" name="TextBox 4">
-            <a:extLst>
-              <a:ext uri="{FF2B5EF4-FFF2-40B4-BE49-F238E27FC236}">
-                <a16:creationId xmlns:a16="http://schemas.microsoft.com/office/drawing/2014/main" id="{4D87AB28-1E02-48D2-B43C-A78F84730187}"/>
+          <p:cNvPr id="6" name="TextBox 5">
+            <a:extLst>
+              <a:ext uri="{FF2B5EF4-FFF2-40B4-BE49-F238E27FC236}">
+                <a16:creationId xmlns:a16="http://schemas.microsoft.com/office/drawing/2014/main" id="{E39B3DAC-1C5C-43A4-90DF-1B0F6D7BC613}"/>
               </a:ext>
             </a:extLst>
           </p:cNvPr>
@@ -5346,8 +5226,8 @@
         </p:nvSpPr>
         <p:spPr>
           <a:xfrm>
-            <a:off x="7484943" y="1278739"/>
-            <a:ext cx="4418197" cy="400110"/>
+            <a:off x="6781800" y="607059"/>
+            <a:ext cx="5222940" cy="400110"/>
           </a:xfrm>
           <a:prstGeom prst="rect">
             <a:avLst/>
@@ -5355,42 +5235,6 @@
           <a:noFill/>
         </p:spPr>
         <p:txBody>
-          <a:bodyPr wrap="none" rtlCol="0">
-            <a:spAutoFit/>
-          </a:bodyPr>
-          <a:lstStyle/>
-          <a:p>
-            <a:pPr algn="r"/>
-            <a:r>
-              <a:rPr lang="en-AU" sz="2000" dirty="0"/>
-              <a:t>Business Establishments by Location</a:t>
-            </a:r>
-          </a:p>
-        </p:txBody>
-      </p:sp>
-      <p:sp>
-        <p:nvSpPr>
-          <p:cNvPr id="6" name="TextBox 5">
-            <a:extLst>
-              <a:ext uri="{FF2B5EF4-FFF2-40B4-BE49-F238E27FC236}">
-                <a16:creationId xmlns:a16="http://schemas.microsoft.com/office/drawing/2014/main" id="{E39B3DAC-1C5C-43A4-90DF-1B0F6D7BC613}"/>
-              </a:ext>
-            </a:extLst>
-          </p:cNvPr>
-          <p:cNvSpPr txBox="1"/>
-          <p:nvPr/>
-        </p:nvSpPr>
-        <p:spPr>
-          <a:xfrm>
-            <a:off x="6781800" y="607059"/>
-            <a:ext cx="5222940" cy="400110"/>
-          </a:xfrm>
-          <a:prstGeom prst="rect">
-            <a:avLst/>
-          </a:prstGeom>
-          <a:noFill/>
-        </p:spPr>
-        <p:txBody>
           <a:bodyPr wrap="square">
             <a:spAutoFit/>
           </a:bodyPr>
@@ -5404,74 +5248,6 @@
           </a:p>
         </p:txBody>
       </p:sp>
-      <p:cxnSp>
-        <p:nvCxnSpPr>
-          <p:cNvPr id="7" name="Straight Connector 6">
-            <a:extLst>
-              <a:ext uri="{FF2B5EF4-FFF2-40B4-BE49-F238E27FC236}">
-                <a16:creationId xmlns:a16="http://schemas.microsoft.com/office/drawing/2014/main" id="{7AE0A1F6-E8E7-41B6-8E7A-919A936BB115}"/>
-              </a:ext>
-            </a:extLst>
-          </p:cNvPr>
-          <p:cNvCxnSpPr>
-            <a:cxnSpLocks/>
-          </p:cNvCxnSpPr>
-          <p:nvPr/>
-        </p:nvCxnSpPr>
-        <p:spPr>
-          <a:xfrm>
-            <a:off x="5549900" y="807114"/>
-            <a:ext cx="0" cy="5809586"/>
-          </a:xfrm>
-          <a:prstGeom prst="line">
-            <a:avLst/>
-          </a:prstGeom>
-        </p:spPr>
-        <p:style>
-          <a:lnRef idx="1">
-            <a:schemeClr val="accent1"/>
-          </a:lnRef>
-          <a:fillRef idx="0">
-            <a:schemeClr val="accent1"/>
-          </a:fillRef>
-          <a:effectRef idx="0">
-            <a:schemeClr val="accent1"/>
-          </a:effectRef>
-          <a:fontRef idx="minor">
-            <a:schemeClr val="tx1"/>
-          </a:fontRef>
-        </p:style>
-      </p:cxnSp>
-      <p:pic>
-        <p:nvPicPr>
-          <p:cNvPr id="9" name="Picture 8">
-            <a:extLst>
-              <a:ext uri="{FF2B5EF4-FFF2-40B4-BE49-F238E27FC236}">
-                <a16:creationId xmlns:a16="http://schemas.microsoft.com/office/drawing/2014/main" id="{46C0ECD9-BD07-4614-BC68-FF9F6DF9655D}"/>
-              </a:ext>
-            </a:extLst>
-          </p:cNvPr>
-          <p:cNvPicPr>
-            <a:picLocks noChangeAspect="1"/>
-          </p:cNvPicPr>
-          <p:nvPr/>
-        </p:nvPicPr>
-        <p:blipFill>
-          <a:blip r:embed="rId2"/>
-          <a:stretch>
-            <a:fillRect/>
-          </a:stretch>
-        </p:blipFill>
-        <p:spPr>
-          <a:xfrm>
-            <a:off x="6781800" y="1748746"/>
-            <a:ext cx="5039428" cy="4867954"/>
-          </a:xfrm>
-          <a:prstGeom prst="rect">
-            <a:avLst/>
-          </a:prstGeom>
-        </p:spPr>
-      </p:pic>
       <p:sp>
         <p:nvSpPr>
           <p:cNvPr id="10" name="TextBox 9">
@@ -5517,7 +5293,7 @@
                 <a:ea typeface="Calibri" panose="020F0502020204030204" pitchFamily="34" charset="0"/>
                 <a:cs typeface="Arial" panose="020B0604020202020204" pitchFamily="34" charset="0"/>
               </a:rPr>
-              <a:t>DATA PROFILE</a:t>
+              <a:t>DATA QUALITY</a:t>
             </a:r>
           </a:p>
           <a:p>
@@ -5542,6 +5318,33 @@
                 <a:spcPct val="107000"/>
               </a:lnSpc>
             </a:pPr>
+            <a:r>
+              <a:rPr lang="en-AU" sz="1600" dirty="0">
+                <a:solidFill>
+                  <a:schemeClr val="bg1"/>
+                </a:solidFill>
+                <a:latin typeface="Arial" panose="020B0604020202020204" pitchFamily="34" charset="0"/>
+                <a:ea typeface="Calibri" panose="020F0502020204030204" pitchFamily="34" charset="0"/>
+                <a:cs typeface="Arial" panose="020B0604020202020204" pitchFamily="34" charset="0"/>
+              </a:rPr>
+              <a:t>29 records with missing Lat, Long and Location</a:t>
+            </a:r>
+            <a:endParaRPr lang="en-AU" sz="1600" dirty="0">
+              <a:solidFill>
+                <a:schemeClr val="bg1"/>
+              </a:solidFill>
+              <a:effectLst/>
+              <a:latin typeface="Arial" panose="020B0604020202020204" pitchFamily="34" charset="0"/>
+              <a:ea typeface="Calibri" panose="020F0502020204030204" pitchFamily="34" charset="0"/>
+              <a:cs typeface="Arial" panose="020B0604020202020204" pitchFamily="34" charset="0"/>
+            </a:endParaRPr>
+          </a:p>
+          <a:p>
+            <a:pPr lvl="0">
+              <a:lnSpc>
+                <a:spcPct val="107000"/>
+              </a:lnSpc>
+            </a:pPr>
             <a:endParaRPr lang="en-AU" sz="1600" dirty="0">
               <a:solidFill>
                 <a:schemeClr val="bg1"/>
@@ -5577,6 +5380,22 @@
               <a:solidFill>
                 <a:schemeClr val="bg1"/>
               </a:solidFill>
+              <a:effectLst/>
+              <a:latin typeface="Arial" panose="020B0604020202020204" pitchFamily="34" charset="0"/>
+              <a:ea typeface="Calibri" panose="020F0502020204030204" pitchFamily="34" charset="0"/>
+              <a:cs typeface="Arial" panose="020B0604020202020204" pitchFamily="34" charset="0"/>
+            </a:endParaRPr>
+          </a:p>
+          <a:p>
+            <a:pPr lvl="0">
+              <a:lnSpc>
+                <a:spcPct val="107000"/>
+              </a:lnSpc>
+            </a:pPr>
+            <a:endParaRPr lang="en-AU" sz="1600" dirty="0">
+              <a:solidFill>
+                <a:schemeClr val="bg1"/>
+              </a:solidFill>
               <a:latin typeface="Arial" panose="020B0604020202020204" pitchFamily="34" charset="0"/>
               <a:ea typeface="Calibri" panose="020F0502020204030204" pitchFamily="34" charset="0"/>
               <a:cs typeface="Arial" panose="020B0604020202020204" pitchFamily="34" charset="0"/>
@@ -5598,55 +5417,38 @@
               <a:cs typeface="Arial" panose="020B0604020202020204" pitchFamily="34" charset="0"/>
             </a:endParaRPr>
           </a:p>
-          <a:p>
-            <a:pPr lvl="0">
-              <a:lnSpc>
-                <a:spcPct val="107000"/>
-              </a:lnSpc>
-            </a:pPr>
-            <a:endParaRPr lang="en-AU" sz="1600" dirty="0">
-              <a:solidFill>
-                <a:schemeClr val="bg1"/>
-              </a:solidFill>
-              <a:effectLst/>
-              <a:latin typeface="Arial" panose="020B0604020202020204" pitchFamily="34" charset="0"/>
-              <a:ea typeface="Calibri" panose="020F0502020204030204" pitchFamily="34" charset="0"/>
-              <a:cs typeface="Arial" panose="020B0604020202020204" pitchFamily="34" charset="0"/>
-            </a:endParaRPr>
-          </a:p>
-          <a:p>
-            <a:pPr lvl="0">
-              <a:lnSpc>
-                <a:spcPct val="107000"/>
-              </a:lnSpc>
-            </a:pPr>
-            <a:endParaRPr lang="en-AU" sz="1600" dirty="0">
-              <a:solidFill>
-                <a:schemeClr val="bg1"/>
-              </a:solidFill>
-              <a:latin typeface="Arial" panose="020B0604020202020204" pitchFamily="34" charset="0"/>
-              <a:ea typeface="Calibri" panose="020F0502020204030204" pitchFamily="34" charset="0"/>
-              <a:cs typeface="Arial" panose="020B0604020202020204" pitchFamily="34" charset="0"/>
-            </a:endParaRPr>
-          </a:p>
-          <a:p>
-            <a:pPr lvl="0">
-              <a:lnSpc>
-                <a:spcPct val="107000"/>
-              </a:lnSpc>
-            </a:pPr>
-            <a:endParaRPr lang="en-AU" sz="1600" dirty="0">
-              <a:solidFill>
-                <a:schemeClr val="bg1"/>
-              </a:solidFill>
-              <a:effectLst/>
-              <a:latin typeface="Arial" panose="020B0604020202020204" pitchFamily="34" charset="0"/>
-              <a:ea typeface="Calibri" panose="020F0502020204030204" pitchFamily="34" charset="0"/>
-              <a:cs typeface="Arial" panose="020B0604020202020204" pitchFamily="34" charset="0"/>
-            </a:endParaRPr>
-          </a:p>
-        </p:txBody>
-      </p:sp>
+        </p:txBody>
+      </p:sp>
+      <p:pic>
+        <p:nvPicPr>
+          <p:cNvPr id="12" name="Picture 11">
+            <a:extLst>
+              <a:ext uri="{FF2B5EF4-FFF2-40B4-BE49-F238E27FC236}">
+                <a16:creationId xmlns:a16="http://schemas.microsoft.com/office/drawing/2014/main" id="{E5EE6722-B916-416D-9C79-AF61EA614A00}"/>
+              </a:ext>
+            </a:extLst>
+          </p:cNvPr>
+          <p:cNvPicPr>
+            <a:picLocks noChangeAspect="1"/>
+          </p:cNvPicPr>
+          <p:nvPr/>
+        </p:nvPicPr>
+        <p:blipFill>
+          <a:blip r:embed="rId2"/>
+          <a:stretch>
+            <a:fillRect/>
+          </a:stretch>
+        </p:blipFill>
+        <p:spPr>
+          <a:xfrm>
+            <a:off x="5650678" y="1490470"/>
+            <a:ext cx="6354062" cy="5039428"/>
+          </a:xfrm>
+          <a:prstGeom prst="rect">
+            <a:avLst/>
+          </a:prstGeom>
+        </p:spPr>
+      </p:pic>
     </p:spTree>
     <p:extLst>
       <p:ext uri="{BB962C8B-B14F-4D97-AF65-F5344CB8AC3E}">
@@ -5679,10 +5481,10 @@
       </p:grpSpPr>
       <p:sp>
         <p:nvSpPr>
-          <p:cNvPr id="2" name="TextBox 1">
-            <a:extLst>
-              <a:ext uri="{FF2B5EF4-FFF2-40B4-BE49-F238E27FC236}">
-                <a16:creationId xmlns:a16="http://schemas.microsoft.com/office/drawing/2014/main" id="{9DE8B960-ED65-48E6-A2C3-8FE26D58E234}"/>
+          <p:cNvPr id="7" name="TextBox 6">
+            <a:extLst>
+              <a:ext uri="{FF2B5EF4-FFF2-40B4-BE49-F238E27FC236}">
+                <a16:creationId xmlns:a16="http://schemas.microsoft.com/office/drawing/2014/main" id="{0DA88B31-672D-47F3-B103-7DF894C8273B}"/>
               </a:ext>
             </a:extLst>
           </p:cNvPr>
@@ -5691,8 +5493,8 @@
         </p:nvSpPr>
         <p:spPr>
           <a:xfrm>
-            <a:off x="508000" y="525173"/>
-            <a:ext cx="5166799" cy="1015663"/>
+            <a:off x="0" y="607059"/>
+            <a:ext cx="5222940" cy="400110"/>
           </a:xfrm>
           <a:prstGeom prst="rect">
             <a:avLst/>
@@ -5700,698 +5502,11 @@
           <a:noFill/>
         </p:spPr>
         <p:txBody>
-          <a:bodyPr wrap="none" rtlCol="0">
-            <a:spAutoFit/>
-          </a:bodyPr>
-          <a:lstStyle/>
-          <a:p>
-            <a:r>
-              <a:rPr lang="en-AU" sz="2000" b="1" dirty="0"/>
-              <a:t>DATASET</a:t>
-            </a:r>
-          </a:p>
-          <a:p>
-            <a:endParaRPr lang="en-AU" sz="2000" b="1" dirty="0">
-              <a:effectLst/>
-              <a:latin typeface="Arial" panose="020B0604020202020204" pitchFamily="34" charset="0"/>
-              <a:ea typeface="Calibri" panose="020F0502020204030204" pitchFamily="34" charset="0"/>
-              <a:cs typeface="Times New Roman" panose="02020603050405020304" pitchFamily="18" charset="0"/>
-            </a:endParaRPr>
-          </a:p>
-          <a:p>
-            <a:r>
-              <a:rPr lang="en-AU" sz="2000" b="1" dirty="0">
-                <a:effectLst/>
-                <a:latin typeface="Arial" panose="020B0604020202020204" pitchFamily="34" charset="0"/>
-                <a:ea typeface="Calibri" panose="020F0502020204030204" pitchFamily="34" charset="0"/>
-                <a:cs typeface="Times New Roman" panose="02020603050405020304" pitchFamily="18" charset="0"/>
-              </a:rPr>
-              <a:t>Cafe, restaurant, bistro seats (dyqx-cfn5)</a:t>
-            </a:r>
-            <a:endParaRPr lang="en-AU" sz="2000" b="1" dirty="0"/>
-          </a:p>
-        </p:txBody>
-      </p:sp>
-      <p:sp>
-        <p:nvSpPr>
-          <p:cNvPr id="4" name="TextBox 3">
-            <a:extLst>
-              <a:ext uri="{FF2B5EF4-FFF2-40B4-BE49-F238E27FC236}">
-                <a16:creationId xmlns:a16="http://schemas.microsoft.com/office/drawing/2014/main" id="{8EBC7341-8B3A-421A-A0A0-9737EB1A5EE3}"/>
-              </a:ext>
-            </a:extLst>
-          </p:cNvPr>
-          <p:cNvSpPr txBox="1"/>
-          <p:nvPr/>
-        </p:nvSpPr>
-        <p:spPr>
-          <a:xfrm>
-            <a:off x="600075" y="1499599"/>
-            <a:ext cx="4338637" cy="2611228"/>
-          </a:xfrm>
-          <a:prstGeom prst="rect">
-            <a:avLst/>
-          </a:prstGeom>
-          <a:solidFill>
-            <a:schemeClr val="bg1">
-              <a:lumMod val="95000"/>
-            </a:schemeClr>
-          </a:solidFill>
-        </p:spPr>
-        <p:txBody>
           <a:bodyPr wrap="square">
             <a:spAutoFit/>
           </a:bodyPr>
           <a:lstStyle/>
           <a:p>
-            <a:pPr lvl="0">
-              <a:lnSpc>
-                <a:spcPct val="107000"/>
-              </a:lnSpc>
-            </a:pPr>
-            <a:r>
-              <a:rPr lang="en-AU" sz="1400" b="1" dirty="0">
-                <a:effectLst/>
-                <a:latin typeface="Arial" panose="020B0604020202020204" pitchFamily="34" charset="0"/>
-                <a:ea typeface="Calibri" panose="020F0502020204030204" pitchFamily="34" charset="0"/>
-                <a:cs typeface="Arial" panose="020B0604020202020204" pitchFamily="34" charset="0"/>
-              </a:rPr>
-              <a:t>Time</a:t>
-            </a:r>
-          </a:p>
-          <a:p>
-            <a:pPr marL="285750" lvl="0" indent="-285750">
-              <a:lnSpc>
-                <a:spcPct val="107000"/>
-              </a:lnSpc>
-              <a:buFont typeface="Arial" panose="020B0604020202020204" pitchFamily="34" charset="0"/>
-              <a:buChar char="•"/>
-            </a:pPr>
-            <a:r>
-              <a:rPr lang="en-AU" sz="1400" dirty="0">
-                <a:effectLst/>
-                <a:latin typeface="Arial" panose="020B0604020202020204" pitchFamily="34" charset="0"/>
-                <a:ea typeface="Calibri" panose="020F0502020204030204" pitchFamily="34" charset="0"/>
-                <a:cs typeface="Arial" panose="020B0604020202020204" pitchFamily="34" charset="0"/>
-              </a:rPr>
-              <a:t>Census Year</a:t>
-            </a:r>
-          </a:p>
-          <a:p>
-            <a:pPr lvl="0">
-              <a:lnSpc>
-                <a:spcPct val="107000"/>
-              </a:lnSpc>
-            </a:pPr>
-            <a:r>
-              <a:rPr lang="en-AU" sz="1400" b="1" dirty="0">
-                <a:latin typeface="Arial" panose="020B0604020202020204" pitchFamily="34" charset="0"/>
-                <a:ea typeface="Calibri" panose="020F0502020204030204" pitchFamily="34" charset="0"/>
-                <a:cs typeface="Arial" panose="020B0604020202020204" pitchFamily="34" charset="0"/>
-              </a:rPr>
-              <a:t>Location</a:t>
-            </a:r>
-          </a:p>
-          <a:p>
-            <a:pPr marL="285750" lvl="0" indent="-285750">
-              <a:lnSpc>
-                <a:spcPct val="107000"/>
-              </a:lnSpc>
-              <a:buFont typeface="Arial" panose="020B0604020202020204" pitchFamily="34" charset="0"/>
-              <a:buChar char="•"/>
-            </a:pPr>
-            <a:r>
-              <a:rPr lang="en-AU" sz="1400" dirty="0">
-                <a:effectLst/>
-                <a:latin typeface="Arial" panose="020B0604020202020204" pitchFamily="34" charset="0"/>
-                <a:ea typeface="Calibri" panose="020F0502020204030204" pitchFamily="34" charset="0"/>
-                <a:cs typeface="Arial" panose="020B0604020202020204" pitchFamily="34" charset="0"/>
-              </a:rPr>
-              <a:t>CLUE Small Area - 13 CLUE areas</a:t>
-            </a:r>
-          </a:p>
-          <a:p>
-            <a:pPr marL="285750" lvl="0" indent="-285750">
-              <a:lnSpc>
-                <a:spcPct val="107000"/>
-              </a:lnSpc>
-              <a:buFont typeface="Arial" panose="020B0604020202020204" pitchFamily="34" charset="0"/>
-              <a:buChar char="•"/>
-            </a:pPr>
-            <a:r>
-              <a:rPr lang="en-AU" sz="1400" dirty="0">
-                <a:effectLst/>
-                <a:latin typeface="Arial" panose="020B0604020202020204" pitchFamily="34" charset="0"/>
-                <a:ea typeface="Calibri" panose="020F0502020204030204" pitchFamily="34" charset="0"/>
-                <a:cs typeface="Arial" panose="020B0604020202020204" pitchFamily="34" charset="0"/>
-              </a:rPr>
-              <a:t>Block ID - 606 Blocks</a:t>
-            </a:r>
-          </a:p>
-          <a:p>
-            <a:pPr marL="285750" lvl="0" indent="-285750">
-              <a:lnSpc>
-                <a:spcPct val="107000"/>
-              </a:lnSpc>
-              <a:buFont typeface="Arial" panose="020B0604020202020204" pitchFamily="34" charset="0"/>
-              <a:buChar char="•"/>
-            </a:pPr>
-            <a:r>
-              <a:rPr lang="en-AU" sz="1400" dirty="0" err="1">
-                <a:effectLst/>
-                <a:latin typeface="Arial" panose="020B0604020202020204" pitchFamily="34" charset="0"/>
-                <a:ea typeface="Calibri" panose="020F0502020204030204" pitchFamily="34" charset="0"/>
-                <a:cs typeface="Arial" panose="020B0604020202020204" pitchFamily="34" charset="0"/>
-              </a:rPr>
-              <a:t>Lat,Long</a:t>
-            </a:r>
-            <a:endParaRPr lang="en-AU" sz="1400" dirty="0">
-              <a:effectLst/>
-              <a:latin typeface="Arial" panose="020B0604020202020204" pitchFamily="34" charset="0"/>
-              <a:ea typeface="Calibri" panose="020F0502020204030204" pitchFamily="34" charset="0"/>
-              <a:cs typeface="Arial" panose="020B0604020202020204" pitchFamily="34" charset="0"/>
-            </a:endParaRPr>
-          </a:p>
-          <a:p>
-            <a:pPr marL="285750" lvl="0" indent="-285750">
-              <a:lnSpc>
-                <a:spcPct val="107000"/>
-              </a:lnSpc>
-              <a:buFont typeface="Arial" panose="020B0604020202020204" pitchFamily="34" charset="0"/>
-              <a:buChar char="•"/>
-            </a:pPr>
-            <a:r>
-              <a:rPr lang="en-AU" sz="1400" dirty="0">
-                <a:effectLst/>
-                <a:latin typeface="Arial" panose="020B0604020202020204" pitchFamily="34" charset="0"/>
-                <a:ea typeface="Calibri" panose="020F0502020204030204" pitchFamily="34" charset="0"/>
-                <a:cs typeface="Arial" panose="020B0604020202020204" pitchFamily="34" charset="0"/>
-              </a:rPr>
-              <a:t>Address</a:t>
-            </a:r>
-          </a:p>
-          <a:p>
-            <a:pPr lvl="0">
-              <a:lnSpc>
-                <a:spcPct val="107000"/>
-              </a:lnSpc>
-            </a:pPr>
-            <a:r>
-              <a:rPr lang="en-AU" sz="1400" b="1" dirty="0">
-                <a:effectLst/>
-                <a:latin typeface="Arial" panose="020B0604020202020204" pitchFamily="34" charset="0"/>
-                <a:ea typeface="Calibri" panose="020F0502020204030204" pitchFamily="34" charset="0"/>
-                <a:cs typeface="Arial" panose="020B0604020202020204" pitchFamily="34" charset="0"/>
-              </a:rPr>
-              <a:t>Business Information</a:t>
-            </a:r>
-          </a:p>
-          <a:p>
-            <a:pPr marL="285750" lvl="0" indent="-285750">
-              <a:lnSpc>
-                <a:spcPct val="107000"/>
-              </a:lnSpc>
-              <a:buFont typeface="Arial" panose="020B0604020202020204" pitchFamily="34" charset="0"/>
-              <a:buChar char="•"/>
-            </a:pPr>
-            <a:r>
-              <a:rPr lang="en-AU" sz="1400" dirty="0">
-                <a:effectLst/>
-                <a:latin typeface="Arial" panose="020B0604020202020204" pitchFamily="34" charset="0"/>
-                <a:ea typeface="Calibri" panose="020F0502020204030204" pitchFamily="34" charset="0"/>
-                <a:cs typeface="Arial" panose="020B0604020202020204" pitchFamily="34" charset="0"/>
-              </a:rPr>
-              <a:t>ANZSIC4 Code,</a:t>
-            </a:r>
-            <a:r>
-              <a:rPr lang="en-AU" sz="1400" dirty="0">
-                <a:latin typeface="Arial" panose="020B0604020202020204" pitchFamily="34" charset="0"/>
-                <a:ea typeface="Calibri" panose="020F0502020204030204" pitchFamily="34" charset="0"/>
-                <a:cs typeface="Arial" panose="020B0604020202020204" pitchFamily="34" charset="0"/>
-              </a:rPr>
-              <a:t>ANZSIC4 Description</a:t>
-            </a:r>
-          </a:p>
-          <a:p>
-            <a:pPr marL="285750" lvl="0" indent="-285750">
-              <a:lnSpc>
-                <a:spcPct val="107000"/>
-              </a:lnSpc>
-              <a:buFont typeface="Arial" panose="020B0604020202020204" pitchFamily="34" charset="0"/>
-              <a:buChar char="•"/>
-            </a:pPr>
-            <a:r>
-              <a:rPr lang="en-AU" sz="1400" dirty="0">
-                <a:effectLst/>
-                <a:latin typeface="Arial" panose="020B0604020202020204" pitchFamily="34" charset="0"/>
-                <a:ea typeface="Calibri" panose="020F0502020204030204" pitchFamily="34" charset="0"/>
-                <a:cs typeface="Arial" panose="020B0604020202020204" pitchFamily="34" charset="0"/>
-              </a:rPr>
-              <a:t>Seating Type</a:t>
-            </a:r>
-          </a:p>
-          <a:p>
-            <a:pPr marL="285750" lvl="0" indent="-285750">
-              <a:lnSpc>
-                <a:spcPct val="107000"/>
-              </a:lnSpc>
-              <a:buFont typeface="Arial" panose="020B0604020202020204" pitchFamily="34" charset="0"/>
-              <a:buChar char="•"/>
-            </a:pPr>
-            <a:r>
-              <a:rPr lang="en-AU" sz="1400" dirty="0">
-                <a:latin typeface="Arial" panose="020B0604020202020204" pitchFamily="34" charset="0"/>
-                <a:ea typeface="Calibri" panose="020F0502020204030204" pitchFamily="34" charset="0"/>
-                <a:cs typeface="Arial" panose="020B0604020202020204" pitchFamily="34" charset="0"/>
-              </a:rPr>
-              <a:t>Number of Seats</a:t>
-            </a:r>
-            <a:endParaRPr lang="en-AU" sz="1400" dirty="0">
-              <a:effectLst/>
-              <a:latin typeface="Arial" panose="020B0604020202020204" pitchFamily="34" charset="0"/>
-              <a:ea typeface="Calibri" panose="020F0502020204030204" pitchFamily="34" charset="0"/>
-              <a:cs typeface="Arial" panose="020B0604020202020204" pitchFamily="34" charset="0"/>
-            </a:endParaRPr>
-          </a:p>
-        </p:txBody>
-      </p:sp>
-      <p:sp>
-        <p:nvSpPr>
-          <p:cNvPr id="6" name="TextBox 5">
-            <a:extLst>
-              <a:ext uri="{FF2B5EF4-FFF2-40B4-BE49-F238E27FC236}">
-                <a16:creationId xmlns:a16="http://schemas.microsoft.com/office/drawing/2014/main" id="{B1B14D50-0CC6-41F7-A405-99D8FDDA05AE}"/>
-              </a:ext>
-            </a:extLst>
-          </p:cNvPr>
-          <p:cNvSpPr txBox="1"/>
-          <p:nvPr/>
-        </p:nvSpPr>
-        <p:spPr>
-          <a:xfrm>
-            <a:off x="7557014" y="1278739"/>
-            <a:ext cx="4346126" cy="877163"/>
-          </a:xfrm>
-          <a:prstGeom prst="rect">
-            <a:avLst/>
-          </a:prstGeom>
-          <a:noFill/>
-        </p:spPr>
-        <p:txBody>
-          <a:bodyPr wrap="none" rtlCol="0">
-            <a:spAutoFit/>
-          </a:bodyPr>
-          <a:lstStyle/>
-          <a:p>
-            <a:pPr algn="r"/>
-            <a:r>
-              <a:rPr lang="en-AU" sz="2000" dirty="0"/>
-              <a:t>Cafes &amp; Restaurants by CLUE Block</a:t>
-            </a:r>
-          </a:p>
-          <a:p>
-            <a:pPr algn="r"/>
-            <a:r>
-              <a:rPr lang="en-AU" sz="1100" dirty="0">
-                <a:effectLst/>
-                <a:latin typeface="Calibri" panose="020F0502020204030204" pitchFamily="34" charset="0"/>
-                <a:ea typeface="Calibri" panose="020F0502020204030204" pitchFamily="34" charset="0"/>
-                <a:cs typeface="Times New Roman" panose="02020603050405020304" pitchFamily="18" charset="0"/>
-              </a:rPr>
-              <a:t>(Source: </a:t>
-            </a:r>
-            <a:r>
-              <a:rPr lang="en-US" sz="1100" dirty="0">
-                <a:hlinkClick r:id="rId2"/>
-              </a:rPr>
-              <a:t>CLUE interactive </a:t>
-            </a:r>
-            <a:r>
-              <a:rPr lang="en-US" sz="1100" dirty="0" err="1">
-                <a:hlinkClick r:id="rId2"/>
-              </a:rPr>
-              <a:t>visualisation</a:t>
-            </a:r>
-            <a:r>
-              <a:rPr lang="en-US" sz="1100" dirty="0">
-                <a:hlinkClick r:id="rId2"/>
-              </a:rPr>
-              <a:t> - City of Melbourne</a:t>
-            </a:r>
-            <a:r>
-              <a:rPr lang="en-US" sz="1100" dirty="0"/>
-              <a:t>)</a:t>
-            </a:r>
-            <a:endParaRPr lang="en-AU" sz="1100" dirty="0">
-              <a:effectLst/>
-              <a:latin typeface="Calibri" panose="020F0502020204030204" pitchFamily="34" charset="0"/>
-              <a:ea typeface="Calibri" panose="020F0502020204030204" pitchFamily="34" charset="0"/>
-              <a:cs typeface="Times New Roman" panose="02020603050405020304" pitchFamily="18" charset="0"/>
-            </a:endParaRPr>
-          </a:p>
-          <a:p>
-            <a:pPr algn="r"/>
-            <a:endParaRPr lang="en-AU" sz="2000" dirty="0"/>
-          </a:p>
-        </p:txBody>
-      </p:sp>
-      <p:sp>
-        <p:nvSpPr>
-          <p:cNvPr id="7" name="TextBox 6">
-            <a:extLst>
-              <a:ext uri="{FF2B5EF4-FFF2-40B4-BE49-F238E27FC236}">
-                <a16:creationId xmlns:a16="http://schemas.microsoft.com/office/drawing/2014/main" id="{0DA88B31-672D-47F3-B103-7DF894C8273B}"/>
-              </a:ext>
-            </a:extLst>
-          </p:cNvPr>
-          <p:cNvSpPr txBox="1"/>
-          <p:nvPr/>
-        </p:nvSpPr>
-        <p:spPr>
-          <a:xfrm>
-            <a:off x="6781800" y="607059"/>
-            <a:ext cx="5222940" cy="400110"/>
-          </a:xfrm>
-          <a:prstGeom prst="rect">
-            <a:avLst/>
-          </a:prstGeom>
-          <a:noFill/>
-        </p:spPr>
-        <p:txBody>
-          <a:bodyPr wrap="square">
-            <a:spAutoFit/>
-          </a:bodyPr>
-          <a:lstStyle/>
-          <a:p>
-            <a:pPr algn="r"/>
-            <a:r>
-              <a:rPr lang="en-AU" sz="2000" b="1" dirty="0"/>
-              <a:t>EXAMPLE DATASET VISUALISATION</a:t>
-            </a:r>
-          </a:p>
-        </p:txBody>
-      </p:sp>
-      <p:cxnSp>
-        <p:nvCxnSpPr>
-          <p:cNvPr id="8" name="Straight Connector 7">
-            <a:extLst>
-              <a:ext uri="{FF2B5EF4-FFF2-40B4-BE49-F238E27FC236}">
-                <a16:creationId xmlns:a16="http://schemas.microsoft.com/office/drawing/2014/main" id="{81442EF5-0C47-4A07-A631-82FE4C74BAE6}"/>
-              </a:ext>
-            </a:extLst>
-          </p:cNvPr>
-          <p:cNvCxnSpPr>
-            <a:cxnSpLocks/>
-          </p:cNvCxnSpPr>
-          <p:nvPr/>
-        </p:nvCxnSpPr>
-        <p:spPr>
-          <a:xfrm>
-            <a:off x="5549900" y="807114"/>
-            <a:ext cx="0" cy="5809586"/>
-          </a:xfrm>
-          <a:prstGeom prst="line">
-            <a:avLst/>
-          </a:prstGeom>
-        </p:spPr>
-        <p:style>
-          <a:lnRef idx="1">
-            <a:schemeClr val="accent1"/>
-          </a:lnRef>
-          <a:fillRef idx="0">
-            <a:schemeClr val="accent1"/>
-          </a:fillRef>
-          <a:effectRef idx="0">
-            <a:schemeClr val="accent1"/>
-          </a:effectRef>
-          <a:fontRef idx="minor">
-            <a:schemeClr val="tx1"/>
-          </a:fontRef>
-        </p:style>
-      </p:cxnSp>
-      <p:pic>
-        <p:nvPicPr>
-          <p:cNvPr id="10" name="Picture 9">
-            <a:extLst>
-              <a:ext uri="{FF2B5EF4-FFF2-40B4-BE49-F238E27FC236}">
-                <a16:creationId xmlns:a16="http://schemas.microsoft.com/office/drawing/2014/main" id="{9C527C35-10FA-4B95-92DF-3A2C181194E8}"/>
-              </a:ext>
-            </a:extLst>
-          </p:cNvPr>
-          <p:cNvPicPr>
-            <a:picLocks noChangeAspect="1"/>
-          </p:cNvPicPr>
-          <p:nvPr/>
-        </p:nvPicPr>
-        <p:blipFill>
-          <a:blip r:embed="rId3"/>
-          <a:stretch>
-            <a:fillRect/>
-          </a:stretch>
-        </p:blipFill>
-        <p:spPr>
-          <a:xfrm>
-            <a:off x="6308648" y="1848177"/>
-            <a:ext cx="5494894" cy="4283121"/>
-          </a:xfrm>
-          <a:prstGeom prst="rect">
-            <a:avLst/>
-          </a:prstGeom>
-        </p:spPr>
-      </p:pic>
-      <p:sp>
-        <p:nvSpPr>
-          <p:cNvPr id="11" name="TextBox 10">
-            <a:extLst>
-              <a:ext uri="{FF2B5EF4-FFF2-40B4-BE49-F238E27FC236}">
-                <a16:creationId xmlns:a16="http://schemas.microsoft.com/office/drawing/2014/main" id="{5D56BC53-3B70-4FC1-8325-6D46870AC05B}"/>
-              </a:ext>
-            </a:extLst>
-          </p:cNvPr>
-          <p:cNvSpPr txBox="1"/>
-          <p:nvPr/>
-        </p:nvSpPr>
-        <p:spPr>
-          <a:xfrm>
-            <a:off x="600074" y="4217399"/>
-            <a:ext cx="4338637" cy="2444387"/>
-          </a:xfrm>
-          <a:prstGeom prst="rect">
-            <a:avLst/>
-          </a:prstGeom>
-          <a:solidFill>
-            <a:schemeClr val="tx1"/>
-          </a:solidFill>
-        </p:spPr>
-        <p:txBody>
-          <a:bodyPr wrap="square">
-            <a:spAutoFit/>
-          </a:bodyPr>
-          <a:lstStyle/>
-          <a:p>
-            <a:pPr lvl="0">
-              <a:lnSpc>
-                <a:spcPct val="107000"/>
-              </a:lnSpc>
-            </a:pPr>
-            <a:r>
-              <a:rPr lang="en-AU" sz="1600" b="1" dirty="0">
-                <a:solidFill>
-                  <a:schemeClr val="bg1"/>
-                </a:solidFill>
-                <a:effectLst/>
-                <a:latin typeface="Arial" panose="020B0604020202020204" pitchFamily="34" charset="0"/>
-                <a:ea typeface="Calibri" panose="020F0502020204030204" pitchFamily="34" charset="0"/>
-                <a:cs typeface="Arial" panose="020B0604020202020204" pitchFamily="34" charset="0"/>
-              </a:rPr>
-              <a:t>DATA PROFILE</a:t>
-            </a:r>
-          </a:p>
-          <a:p>
-            <a:pPr lvl="0">
-              <a:lnSpc>
-                <a:spcPct val="107000"/>
-              </a:lnSpc>
-            </a:pPr>
-            <a:endParaRPr lang="en-AU" sz="1600" dirty="0">
-              <a:solidFill>
-                <a:schemeClr val="bg1"/>
-              </a:solidFill>
-              <a:effectLst/>
-              <a:latin typeface="Arial" panose="020B0604020202020204" pitchFamily="34" charset="0"/>
-              <a:ea typeface="Calibri" panose="020F0502020204030204" pitchFamily="34" charset="0"/>
-              <a:cs typeface="Arial" panose="020B0604020202020204" pitchFamily="34" charset="0"/>
-            </a:endParaRPr>
-          </a:p>
-          <a:p>
-            <a:pPr lvl="0">
-              <a:lnSpc>
-                <a:spcPct val="107000"/>
-              </a:lnSpc>
-            </a:pPr>
-            <a:endParaRPr lang="en-AU" sz="1600" dirty="0">
-              <a:solidFill>
-                <a:schemeClr val="bg1"/>
-              </a:solidFill>
-              <a:latin typeface="Arial" panose="020B0604020202020204" pitchFamily="34" charset="0"/>
-              <a:ea typeface="Calibri" panose="020F0502020204030204" pitchFamily="34" charset="0"/>
-              <a:cs typeface="Arial" panose="020B0604020202020204" pitchFamily="34" charset="0"/>
-            </a:endParaRPr>
-          </a:p>
-          <a:p>
-            <a:pPr lvl="0">
-              <a:lnSpc>
-                <a:spcPct val="107000"/>
-              </a:lnSpc>
-            </a:pPr>
-            <a:endParaRPr lang="en-AU" sz="1600" dirty="0">
-              <a:solidFill>
-                <a:schemeClr val="bg1"/>
-              </a:solidFill>
-              <a:effectLst/>
-              <a:latin typeface="Arial" panose="020B0604020202020204" pitchFamily="34" charset="0"/>
-              <a:ea typeface="Calibri" panose="020F0502020204030204" pitchFamily="34" charset="0"/>
-              <a:cs typeface="Arial" panose="020B0604020202020204" pitchFamily="34" charset="0"/>
-            </a:endParaRPr>
-          </a:p>
-          <a:p>
-            <a:pPr lvl="0">
-              <a:lnSpc>
-                <a:spcPct val="107000"/>
-              </a:lnSpc>
-            </a:pPr>
-            <a:endParaRPr lang="en-AU" sz="1600" dirty="0">
-              <a:solidFill>
-                <a:schemeClr val="bg1"/>
-              </a:solidFill>
-              <a:latin typeface="Arial" panose="020B0604020202020204" pitchFamily="34" charset="0"/>
-              <a:ea typeface="Calibri" panose="020F0502020204030204" pitchFamily="34" charset="0"/>
-              <a:cs typeface="Arial" panose="020B0604020202020204" pitchFamily="34" charset="0"/>
-            </a:endParaRPr>
-          </a:p>
-          <a:p>
-            <a:pPr lvl="0">
-              <a:lnSpc>
-                <a:spcPct val="107000"/>
-              </a:lnSpc>
-            </a:pPr>
-            <a:endParaRPr lang="en-AU" sz="1600" dirty="0">
-              <a:solidFill>
-                <a:schemeClr val="bg1"/>
-              </a:solidFill>
-              <a:effectLst/>
-              <a:latin typeface="Arial" panose="020B0604020202020204" pitchFamily="34" charset="0"/>
-              <a:ea typeface="Calibri" panose="020F0502020204030204" pitchFamily="34" charset="0"/>
-              <a:cs typeface="Arial" panose="020B0604020202020204" pitchFamily="34" charset="0"/>
-            </a:endParaRPr>
-          </a:p>
-          <a:p>
-            <a:pPr lvl="0">
-              <a:lnSpc>
-                <a:spcPct val="107000"/>
-              </a:lnSpc>
-            </a:pPr>
-            <a:endParaRPr lang="en-AU" sz="1600" dirty="0">
-              <a:solidFill>
-                <a:schemeClr val="bg1"/>
-              </a:solidFill>
-              <a:effectLst/>
-              <a:latin typeface="Arial" panose="020B0604020202020204" pitchFamily="34" charset="0"/>
-              <a:ea typeface="Calibri" panose="020F0502020204030204" pitchFamily="34" charset="0"/>
-              <a:cs typeface="Arial" panose="020B0604020202020204" pitchFamily="34" charset="0"/>
-            </a:endParaRPr>
-          </a:p>
-          <a:p>
-            <a:pPr lvl="0">
-              <a:lnSpc>
-                <a:spcPct val="107000"/>
-              </a:lnSpc>
-            </a:pPr>
-            <a:endParaRPr lang="en-AU" sz="1600" dirty="0">
-              <a:solidFill>
-                <a:schemeClr val="bg1"/>
-              </a:solidFill>
-              <a:latin typeface="Arial" panose="020B0604020202020204" pitchFamily="34" charset="0"/>
-              <a:ea typeface="Calibri" panose="020F0502020204030204" pitchFamily="34" charset="0"/>
-              <a:cs typeface="Arial" panose="020B0604020202020204" pitchFamily="34" charset="0"/>
-            </a:endParaRPr>
-          </a:p>
-          <a:p>
-            <a:pPr lvl="0">
-              <a:lnSpc>
-                <a:spcPct val="107000"/>
-              </a:lnSpc>
-            </a:pPr>
-            <a:endParaRPr lang="en-AU" sz="1600" dirty="0">
-              <a:solidFill>
-                <a:schemeClr val="bg1"/>
-              </a:solidFill>
-              <a:effectLst/>
-              <a:latin typeface="Arial" panose="020B0604020202020204" pitchFamily="34" charset="0"/>
-              <a:ea typeface="Calibri" panose="020F0502020204030204" pitchFamily="34" charset="0"/>
-              <a:cs typeface="Arial" panose="020B0604020202020204" pitchFamily="34" charset="0"/>
-            </a:endParaRPr>
-          </a:p>
-        </p:txBody>
-      </p:sp>
-    </p:spTree>
-    <p:extLst>
-      <p:ext uri="{BB962C8B-B14F-4D97-AF65-F5344CB8AC3E}">
-        <p14:creationId xmlns:p14="http://schemas.microsoft.com/office/powerpoint/2010/main" val="413637564"/>
-      </p:ext>
-    </p:extLst>
-  </p:cSld>
-  <p:clrMapOvr>
-    <a:masterClrMapping/>
-  </p:clrMapOvr>
-</p:sld>
-</file>
-
-<file path=ppt/slides/slide5.xml><?xml version="1.0" encoding="utf-8"?>
-<p:sld xmlns:a="http://schemas.openxmlformats.org/drawingml/2006/main" xmlns:r="http://schemas.openxmlformats.org/officeDocument/2006/relationships" xmlns:p="http://schemas.openxmlformats.org/presentationml/2006/main">
-  <p:cSld>
-    <p:spTree>
-      <p:nvGrpSpPr>
-        <p:cNvPr id="1" name=""/>
-        <p:cNvGrpSpPr/>
-        <p:nvPr/>
-      </p:nvGrpSpPr>
-      <p:grpSpPr>
-        <a:xfrm>
-          <a:off x="0" y="0"/>
-          <a:ext cx="0" cy="0"/>
-          <a:chOff x="0" y="0"/>
-          <a:chExt cx="0" cy="0"/>
-        </a:xfrm>
-      </p:grpSpPr>
-      <p:sp>
-        <p:nvSpPr>
-          <p:cNvPr id="7" name="TextBox 6">
-            <a:extLst>
-              <a:ext uri="{FF2B5EF4-FFF2-40B4-BE49-F238E27FC236}">
-                <a16:creationId xmlns:a16="http://schemas.microsoft.com/office/drawing/2014/main" id="{0DA88B31-672D-47F3-B103-7DF894C8273B}"/>
-              </a:ext>
-            </a:extLst>
-          </p:cNvPr>
-          <p:cNvSpPr txBox="1"/>
-          <p:nvPr/>
-        </p:nvSpPr>
-        <p:spPr>
-          <a:xfrm>
-            <a:off x="0" y="607059"/>
-            <a:ext cx="5222940" cy="400110"/>
-          </a:xfrm>
-          <a:prstGeom prst="rect">
-            <a:avLst/>
-          </a:prstGeom>
-          <a:noFill/>
-        </p:spPr>
-        <p:txBody>
-          <a:bodyPr wrap="square">
-            <a:spAutoFit/>
-          </a:bodyPr>
-          <a:lstStyle/>
-          <a:p>
             <a:pPr algn="r"/>
             <a:r>
               <a:rPr lang="en-AU" sz="2000" b="1" dirty="0"/>
@@ -6400,36 +5515,6 @@
           </a:p>
         </p:txBody>
       </p:sp>
-      <p:pic>
-        <p:nvPicPr>
-          <p:cNvPr id="5" name="Picture 4">
-            <a:extLst>
-              <a:ext uri="{FF2B5EF4-FFF2-40B4-BE49-F238E27FC236}">
-                <a16:creationId xmlns:a16="http://schemas.microsoft.com/office/drawing/2014/main" id="{88420804-9B9F-4660-BE75-D4CD3F461BFD}"/>
-              </a:ext>
-            </a:extLst>
-          </p:cNvPr>
-          <p:cNvPicPr>
-            <a:picLocks noChangeAspect="1"/>
-          </p:cNvPicPr>
-          <p:nvPr/>
-        </p:nvPicPr>
-        <p:blipFill>
-          <a:blip r:embed="rId2"/>
-          <a:stretch>
-            <a:fillRect/>
-          </a:stretch>
-        </p:blipFill>
-        <p:spPr>
-          <a:xfrm>
-            <a:off x="0" y="2069629"/>
-            <a:ext cx="12192000" cy="4788371"/>
-          </a:xfrm>
-          <a:prstGeom prst="rect">
-            <a:avLst/>
-          </a:prstGeom>
-        </p:spPr>
-      </p:pic>
       <p:sp>
         <p:nvSpPr>
           <p:cNvPr id="11" name="TextBox 10">
@@ -6517,7 +5602,7 @@
 </p:sld>
 </file>
 
-<file path=ppt/slides/slide6.xml><?xml version="1.0" encoding="utf-8"?>
+<file path=ppt/slides/slide5.xml><?xml version="1.0" encoding="utf-8"?>
 <p:sld xmlns:a="http://schemas.openxmlformats.org/drawingml/2006/main" xmlns:r="http://schemas.openxmlformats.org/officeDocument/2006/relationships" xmlns:p="http://schemas.openxmlformats.org/presentationml/2006/main">
   <p:cSld>
     <p:spTree>

</xml_diff>